<commit_message>
Coursera: Capstone - Vienna Districts
</commit_message>
<xml_diff>
--- a/capstone.pptx
+++ b/capstone.pptx
@@ -226,7 +226,7 @@
             <a:pPr rtl="0"/>
             <a:fld id="{07A35F69-4CB6-4D1D-8669-0F777E5A1403}" type="datetime1">
               <a:rPr lang="de-DE" smtClean="0"/>
-              <a:t>14.09.2019</a:t>
+              <a:t>15.09.2019</a:t>
             </a:fld>
             <a:endParaRPr lang="de-DE"/>
           </a:p>
@@ -396,7 +396,7 @@
             <a:pPr rtl="0"/>
             <a:fld id="{233CAAB3-F9E4-44A4-85E6-38F2EC756374}" type="datetime1">
               <a:rPr lang="de-DE" noProof="0" smtClean="0"/>
-              <a:t>14.09.2019</a:t>
+              <a:t>15.09.2019</a:t>
             </a:fld>
             <a:endParaRPr lang="de-DE" noProof="0"/>
           </a:p>
@@ -1834,7 +1834,7 @@
             <a:pPr rtl="0"/>
             <a:fld id="{C011BD08-7AD2-4768-9621-064212DF418C}" type="datetime1">
               <a:rPr lang="de-DE" noProof="0" smtClean="0"/>
-              <a:t>14.09.2019</a:t>
+              <a:t>15.09.2019</a:t>
             </a:fld>
             <a:endParaRPr lang="de-DE" noProof="0"/>
           </a:p>
@@ -2027,7 +2027,7 @@
             <a:pPr rtl="0"/>
             <a:fld id="{E97BBC8D-AE3D-4142-A776-8335C2FF8166}" type="datetime1">
               <a:rPr lang="de-DE" noProof="0" smtClean="0"/>
-              <a:t>14.09.2019</a:t>
+              <a:t>15.09.2019</a:t>
             </a:fld>
             <a:endParaRPr lang="de-DE" noProof="0"/>
           </a:p>
@@ -2230,7 +2230,7 @@
             <a:pPr rtl="0"/>
             <a:fld id="{576E8D54-A8F7-4B95-8F95-698BF2202510}" type="datetime1">
               <a:rPr lang="de-DE" noProof="0" smtClean="0"/>
-              <a:t>14.09.2019</a:t>
+              <a:t>15.09.2019</a:t>
             </a:fld>
             <a:endParaRPr lang="de-DE" noProof="0"/>
           </a:p>
@@ -2423,7 +2423,7 @@
             <a:pPr rtl="0"/>
             <a:fld id="{FE53449A-9996-4EA3-8C90-089AA673BF78}" type="datetime1">
               <a:rPr lang="de-DE" noProof="0" smtClean="0"/>
-              <a:t>14.09.2019</a:t>
+              <a:t>15.09.2019</a:t>
             </a:fld>
             <a:endParaRPr lang="de-DE" noProof="0"/>
           </a:p>
@@ -2710,7 +2710,7 @@
             <a:pPr rtl="0"/>
             <a:fld id="{8C05E2B9-94C6-48F8-9777-E614F4FCB02F}" type="datetime1">
               <a:rPr lang="de-DE" noProof="0" smtClean="0"/>
-              <a:t>14.09.2019</a:t>
+              <a:t>15.09.2019</a:t>
             </a:fld>
             <a:endParaRPr lang="de-DE" noProof="0"/>
           </a:p>
@@ -3025,7 +3025,7 @@
             <a:pPr rtl="0"/>
             <a:fld id="{759AF43D-2D65-4A1A-9F87-8189D0A73A6E}" type="datetime1">
               <a:rPr lang="de-DE" noProof="0" smtClean="0"/>
-              <a:t>14.09.2019</a:t>
+              <a:t>15.09.2019</a:t>
             </a:fld>
             <a:endParaRPr lang="de-DE" noProof="0"/>
           </a:p>
@@ -3480,7 +3480,7 @@
             <a:pPr rtl="0"/>
             <a:fld id="{4A384DEE-6327-4233-8892-CF6D12EE7720}" type="datetime1">
               <a:rPr lang="de-DE" noProof="0" smtClean="0"/>
-              <a:t>14.09.2019</a:t>
+              <a:t>15.09.2019</a:t>
             </a:fld>
             <a:endParaRPr lang="de-DE" noProof="0"/>
           </a:p>
@@ -3621,7 +3621,7 @@
             <a:pPr rtl="0"/>
             <a:fld id="{AEF4FA52-3300-4E0F-89A3-F266D080AF0C}" type="datetime1">
               <a:rPr lang="de-DE" noProof="0" smtClean="0"/>
-              <a:t>14.09.2019</a:t>
+              <a:t>15.09.2019</a:t>
             </a:fld>
             <a:endParaRPr lang="de-DE" noProof="0"/>
           </a:p>
@@ -3748,7 +3748,7 @@
             <a:pPr rtl="0"/>
             <a:fld id="{2FC28340-C8AC-4D47-AEF1-894B2BDBD702}" type="datetime1">
               <a:rPr lang="de-DE" noProof="0" smtClean="0"/>
-              <a:t>14.09.2019</a:t>
+              <a:t>15.09.2019</a:t>
             </a:fld>
             <a:endParaRPr lang="de-DE" noProof="0"/>
           </a:p>
@@ -4077,7 +4077,7 @@
             <a:pPr rtl="0"/>
             <a:fld id="{BBF3F2CD-D92F-418F-9455-C5DA9FA4816D}" type="datetime1">
               <a:rPr lang="de-DE" noProof="0" smtClean="0"/>
-              <a:t>14.09.2019</a:t>
+              <a:t>15.09.2019</a:t>
             </a:fld>
             <a:endParaRPr lang="de-DE" noProof="0"/>
           </a:p>
@@ -4577,7 +4577,7 @@
             <a:pPr rtl="0"/>
             <a:fld id="{115949A8-D6D6-45C6-87FD-95146D669DF0}" type="datetime1">
               <a:rPr lang="de-DE" noProof="0" smtClean="0"/>
-              <a:t>14.09.2019</a:t>
+              <a:t>15.09.2019</a:t>
             </a:fld>
             <a:endParaRPr lang="de-DE" noProof="0"/>
           </a:p>
@@ -5101,63 +5101,47 @@
             <a:pPr rtl="0"/>
             <a:r>
               <a:rPr lang="de-DE" dirty="0" err="1"/>
-              <a:t>Where</a:t>
-            </a:r>
-            <a:r>
-              <a:rPr lang="de-DE" dirty="0"/>
-              <a:t> </a:t>
-            </a:r>
-            <a:r>
-              <a:rPr lang="de-DE" dirty="0" err="1"/>
-              <a:t>to</a:t>
-            </a:r>
-            <a:r>
-              <a:rPr lang="de-DE" dirty="0"/>
-              <a:t> find </a:t>
-            </a:r>
-            <a:r>
-              <a:rPr lang="de-DE" dirty="0" err="1"/>
-              <a:t>good</a:t>
-            </a:r>
-            <a:r>
-              <a:rPr lang="de-DE" dirty="0"/>
-              <a:t> </a:t>
-            </a:r>
-            <a:r>
-              <a:rPr lang="de-DE" dirty="0" err="1"/>
-              <a:t>deals</a:t>
-            </a:r>
-            <a:r>
-              <a:rPr lang="de-DE" dirty="0"/>
-              <a:t> in </a:t>
-            </a:r>
-            <a:r>
-              <a:rPr lang="de-DE" dirty="0" err="1"/>
-              <a:t>the</a:t>
-            </a:r>
-            <a:r>
-              <a:rPr lang="de-DE" dirty="0"/>
-              <a:t> </a:t>
-            </a:r>
-            <a:r>
-              <a:rPr lang="de-DE" dirty="0" err="1"/>
-              <a:t>current</a:t>
-            </a:r>
-            <a:r>
-              <a:rPr lang="de-DE" dirty="0"/>
-              <a:t> real </a:t>
-            </a:r>
-            <a:r>
-              <a:rPr lang="de-DE" dirty="0" err="1"/>
-              <a:t>estate</a:t>
-            </a:r>
-            <a:r>
-              <a:rPr lang="de-DE" dirty="0"/>
-              <a:t> </a:t>
-            </a:r>
-            <a:r>
-              <a:rPr lang="de-DE" dirty="0" err="1"/>
-              <a:t>environment</a:t>
+              <a:t>Similarities</a:t>
+            </a:r>
+            <a:r>
+              <a:rPr lang="de-DE" dirty="0"/>
+              <a:t> and </a:t>
+            </a:r>
+            <a:r>
+              <a:rPr lang="de-DE" dirty="0" err="1"/>
+              <a:t>price</a:t>
+            </a:r>
+            <a:r>
+              <a:rPr lang="de-DE" dirty="0"/>
+              <a:t> </a:t>
+            </a:r>
+            <a:r>
+              <a:rPr lang="de-DE" dirty="0" err="1"/>
+              <a:t>differences</a:t>
+            </a:r>
+            <a:r>
+              <a:rPr lang="de-DE" dirty="0"/>
+              <a:t> </a:t>
+            </a:r>
+            <a:r>
+              <a:rPr lang="de-DE" dirty="0" err="1"/>
+              <a:t>of</a:t>
+            </a:r>
+            <a:r>
+              <a:rPr lang="de-DE" dirty="0"/>
+              <a:t> </a:t>
+            </a:r>
+            <a:r>
+              <a:rPr lang="de-DE" dirty="0" err="1"/>
+              <a:t>Vienna‘s</a:t>
+            </a:r>
+            <a:r>
+              <a:rPr lang="de-DE" dirty="0"/>
+              <a:t> 23 </a:t>
+            </a:r>
+            <a:r>
+              <a:rPr lang="de-DE" dirty="0" err="1"/>
+              <a:t>districts</a:t>
             </a:r>
             <a:r>
               <a:rPr lang="de-DE" dirty="0"/>
@@ -7647,7 +7631,12 @@
             <p:ph idx="1"/>
           </p:nvPr>
         </p:nvSpPr>
-        <p:spPr/>
+        <p:spPr>
+          <a:xfrm>
+            <a:off x="1065212" y="1828800"/>
+            <a:ext cx="8686801" cy="4191000"/>
+          </a:xfrm>
+        </p:spPr>
         <p:txBody>
           <a:bodyPr rtlCol="0"/>
           <a:lstStyle/>
@@ -7662,7 +7651,7 @@
       </p:sp>
       <p:pic>
         <p:nvPicPr>
-          <p:cNvPr id="7" name="Grafik 6" descr="Ein Bild, das Screenshot enthält.&#10;&#10;Automatisch generierte Beschreibung">
+          <p:cNvPr id="7" name="Grafik 6">
             <a:extLst>
               <a:ext uri="{FF2B5EF4-FFF2-40B4-BE49-F238E27FC236}">
                 <a16:creationId xmlns:a16="http://schemas.microsoft.com/office/drawing/2014/main" id="{A900E7D6-5FF1-4708-98DC-8A974C5CAA05}"/>
@@ -7676,13 +7665,13 @@
         </p:nvPicPr>
         <p:blipFill rotWithShape="1">
           <a:blip r:embed="rId3"/>
-          <a:srcRect l="-1564" t="7392" r="6609" b="4957"/>
+          <a:srcRect l="1400" t="7835" r="6964" b="6256"/>
           <a:stretch/>
         </p:blipFill>
         <p:spPr>
           <a:xfrm>
-            <a:off x="1043674" y="2133600"/>
-            <a:ext cx="7282985" cy="4191000"/>
+            <a:off x="1773932" y="2193776"/>
+            <a:ext cx="6552728" cy="4095455"/>
           </a:xfrm>
           <a:prstGeom prst="rect">
             <a:avLst/>
@@ -7773,6 +7762,57 @@
           </a:fontRef>
         </p:style>
       </p:cxnSp>
+      <p:sp>
+        <p:nvSpPr>
+          <p:cNvPr id="8" name="Textfeld 7">
+            <a:extLst>
+              <a:ext uri="{FF2B5EF4-FFF2-40B4-BE49-F238E27FC236}">
+                <a16:creationId xmlns:a16="http://schemas.microsoft.com/office/drawing/2014/main" id="{956216E0-4932-4CD6-9151-457455CD55A2}"/>
+              </a:ext>
+            </a:extLst>
+          </p:cNvPr>
+          <p:cNvSpPr txBox="1"/>
+          <p:nvPr/>
+        </p:nvSpPr>
+        <p:spPr>
+          <a:xfrm>
+            <a:off x="1053852" y="4941168"/>
+            <a:ext cx="864096" cy="215444"/>
+          </a:xfrm>
+          <a:prstGeom prst="rect">
+            <a:avLst/>
+          </a:prstGeom>
+          <a:noFill/>
+        </p:spPr>
+        <p:txBody>
+          <a:bodyPr wrap="square" rtlCol="0">
+            <a:spAutoFit/>
+          </a:bodyPr>
+          <a:lstStyle/>
+          <a:p>
+            <a:pPr algn="r"/>
+            <a:r>
+              <a:rPr lang="en-US" sz="800" dirty="0" err="1">
+                <a:solidFill>
+                  <a:schemeClr val="tx1">
+                    <a:lumMod val="65000"/>
+                    <a:lumOff val="35000"/>
+                  </a:schemeClr>
+                </a:solidFill>
+              </a:rPr>
+              <a:t>Rudo</a:t>
+            </a:r>
+            <a:endParaRPr lang="en-US" sz="800" dirty="0">
+              <a:solidFill>
+                <a:schemeClr val="tx1">
+                  <a:lumMod val="65000"/>
+                  <a:lumOff val="35000"/>
+                </a:schemeClr>
+              </a:solidFill>
+            </a:endParaRPr>
+          </a:p>
+        </p:txBody>
+      </p:sp>
     </p:spTree>
     <p:extLst>
       <p:ext uri="{BB962C8B-B14F-4D97-AF65-F5344CB8AC3E}">
@@ -8463,7 +8503,7 @@
             </a:r>
             <a:r>
               <a:rPr lang="de-DE" dirty="0" err="1"/>
-              <a:t>differences</a:t>
+              <a:t>similarities</a:t>
             </a:r>
             <a:r>
               <a:rPr lang="de-DE" dirty="0"/>
@@ -8760,15 +8800,15 @@
             </a:r>
             <a:r>
               <a:rPr lang="de-DE" dirty="0" err="1"/>
-              <a:t>each</a:t>
-            </a:r>
-            <a:r>
-              <a:rPr lang="de-DE" dirty="0"/>
-              <a:t> </a:t>
-            </a:r>
-            <a:r>
-              <a:rPr lang="de-DE" dirty="0" err="1"/>
-              <a:t>district</a:t>
+              <a:t>the</a:t>
+            </a:r>
+            <a:r>
+              <a:rPr lang="de-DE" dirty="0"/>
+              <a:t> </a:t>
+            </a:r>
+            <a:r>
+              <a:rPr lang="de-DE" dirty="0" err="1"/>
+              <a:t>city</a:t>
             </a:r>
             <a:r>
               <a:rPr lang="de-DE" dirty="0"/>
@@ -8788,7 +8828,7 @@
             </a:r>
             <a:r>
               <a:rPr lang="de-DE" dirty="0"/>
-              <a:t> and individual  </a:t>
+              <a:t> and individual </a:t>
             </a:r>
             <a:r>
               <a:rPr lang="de-DE" dirty="0" err="1"/>
@@ -8828,15 +8868,7 @@
             </a:r>
             <a:r>
               <a:rPr lang="de-DE" dirty="0"/>
-              <a:t> personal </a:t>
-            </a:r>
-            <a:r>
-              <a:rPr lang="de-DE" dirty="0" err="1"/>
-              <a:t>regionaln</a:t>
-            </a:r>
-            <a:r>
-              <a:rPr lang="de-DE" dirty="0"/>
-              <a:t> </a:t>
+              <a:t> personal regional </a:t>
             </a:r>
             <a:r>
               <a:rPr lang="de-DE" dirty="0" err="1"/>
@@ -8881,6 +8913,14 @@
             <a:r>
               <a:rPr lang="de-DE" dirty="0" err="1"/>
               <a:t>clusters</a:t>
+            </a:r>
+            <a:r>
+              <a:rPr lang="de-DE" dirty="0"/>
+              <a:t> in </a:t>
+            </a:r>
+            <a:r>
+              <a:rPr lang="de-DE" dirty="0" err="1"/>
+              <a:t>detail</a:t>
             </a:r>
             <a:r>
               <a:rPr lang="de-DE" dirty="0"/>
@@ -9177,6 +9217,14 @@
             </a:r>
             <a:r>
               <a:rPr lang="de-DE" dirty="0" err="1"/>
+              <a:t>exist</a:t>
+            </a:r>
+            <a:r>
+              <a:rPr lang="de-DE" dirty="0"/>
+              <a:t> </a:t>
+            </a:r>
+            <a:r>
+              <a:rPr lang="de-DE" dirty="0" err="1"/>
               <a:t>with</a:t>
             </a:r>
             <a:r>
@@ -9229,15 +9277,7 @@
             </a:r>
             <a:r>
               <a:rPr lang="de-DE" dirty="0"/>
-              <a:t> </a:t>
-            </a:r>
-            <a:r>
-              <a:rPr lang="de-DE" dirty="0" err="1"/>
-              <a:t>have</a:t>
-            </a:r>
-            <a:r>
-              <a:rPr lang="de-DE" dirty="0"/>
-              <a:t> </a:t>
+              <a:t>, but </a:t>
             </a:r>
             <a:r>
               <a:rPr lang="de-DE" dirty="0" err="1"/>

</xml_diff>